<commit_message>
added hyperlink to Sample In Action
</commit_message>
<xml_diff>
--- a/BPraditkul_Portfolio.pptx
+++ b/BPraditkul_Portfolio.pptx
@@ -4368,15 +4368,7 @@
                 <a:schemeClr val="bg1"/>
               </a:solidFill>
             </a:rPr>
-            <a:t>lock </a:t>
-          </a:r>
-          <a:r>
-            <a:rPr lang="en" dirty="0" smtClean="0">
-              <a:solidFill>
-                <a:schemeClr val="bg1"/>
-              </a:solidFill>
-            </a:rPr>
-            <a:t>down access/controls</a:t>
+            <a:t>lock down access/controls</a:t>
           </a:r>
           <a:r>
             <a:rPr lang="en-US" dirty="0" smtClean="0">
@@ -5279,15 +5271,7 @@
         <a:p>
           <a:r>
             <a:rPr lang="en-US" dirty="0" smtClean="0"/>
-            <a:t>Build multiple communication channels (chat, workspace, email distributions, </a:t>
-          </a:r>
-          <a:r>
-            <a:rPr lang="en-US" dirty="0" smtClean="0"/>
-            <a:t>knowledge-shares</a:t>
-          </a:r>
-          <a:r>
-            <a:rPr lang="en-US" dirty="0" smtClean="0"/>
-            <a:t>)</a:t>
+            <a:t>Build multiple communication channels (chat, workspace, email distributions, knowledge-shares)</a:t>
           </a:r>
           <a:endParaRPr lang="en-US" dirty="0"/>
         </a:p>
@@ -8725,15 +8709,7 @@
                 <a:schemeClr val="bg1"/>
               </a:solidFill>
             </a:rPr>
-            <a:t>lock </a:t>
-          </a:r>
-          <a:r>
-            <a:rPr lang="en" sz="1100" kern="1200" dirty="0" smtClean="0">
-              <a:solidFill>
-                <a:schemeClr val="bg1"/>
-              </a:solidFill>
-            </a:rPr>
-            <a:t>down access/controls</a:t>
+            <a:t>lock down access/controls</a:t>
           </a:r>
           <a:r>
             <a:rPr lang="en-US" sz="1100" kern="1200" dirty="0" smtClean="0">
@@ -9733,15 +9709,7 @@
           </a:pPr>
           <a:r>
             <a:rPr lang="en-US" sz="1200" kern="1200" dirty="0" smtClean="0"/>
-            <a:t>Build multiple communication channels (chat, workspace, email distributions, </a:t>
-          </a:r>
-          <a:r>
-            <a:rPr lang="en-US" sz="1200" kern="1200" dirty="0" smtClean="0"/>
-            <a:t>knowledge-shares</a:t>
-          </a:r>
-          <a:r>
-            <a:rPr lang="en-US" sz="1200" kern="1200" dirty="0" smtClean="0"/>
-            <a:t>)</a:t>
+            <a:t>Build multiple communication channels (chat, workspace, email distributions, knowledge-shares)</a:t>
           </a:r>
           <a:endParaRPr lang="en-US" sz="1200" kern="1200" dirty="0"/>
         </a:p>
@@ -16927,7 +16895,7 @@
           <a:p>
             <a:fld id="{26470B8E-3A81-7D47-9BCB-B009F06C3B3A}" type="datetimeFigureOut">
               <a:rPr lang="en-US" smtClean="0"/>
-              <a:t>9/29/17</a:t>
+              <a:t>10/2/17</a:t>
             </a:fld>
             <a:endParaRPr lang="en-US"/>
           </a:p>
@@ -17680,6 +17648,90 @@
           <a:p>
             <a:fld id="{3B678425-7935-0947-9D6B-A56BEF3384E0}" type="slidenum">
               <a:rPr lang="en-US" smtClean="0"/>
+              <a:t>8</a:t>
+            </a:fld>
+            <a:endParaRPr lang="en-US"/>
+          </a:p>
+        </p:txBody>
+      </p:sp>
+    </p:spTree>
+    <p:extLst>
+      <p:ext uri="{BB962C8B-B14F-4D97-AF65-F5344CB8AC3E}">
+        <p14:creationId xmlns:p14="http://schemas.microsoft.com/office/powerpoint/2010/main" val="943240032"/>
+      </p:ext>
+    </p:extLst>
+  </p:cSld>
+  <p:clrMapOvr>
+    <a:masterClrMapping/>
+  </p:clrMapOvr>
+</p:notes>
+</file>
+
+<file path=ppt/notesSlides/notesSlide7.xml><?xml version="1.0" encoding="utf-8"?>
+<p:notes xmlns:a="http://schemas.openxmlformats.org/drawingml/2006/main" xmlns:r="http://schemas.openxmlformats.org/officeDocument/2006/relationships" xmlns:p="http://schemas.openxmlformats.org/presentationml/2006/main">
+  <p:cSld>
+    <p:spTree>
+      <p:nvGrpSpPr>
+        <p:cNvPr id="1" name=""/>
+        <p:cNvGrpSpPr/>
+        <p:nvPr/>
+      </p:nvGrpSpPr>
+      <p:grpSpPr>
+        <a:xfrm>
+          <a:off x="0" y="0"/>
+          <a:ext cx="0" cy="0"/>
+          <a:chOff x="0" y="0"/>
+          <a:chExt cx="0" cy="0"/>
+        </a:xfrm>
+      </p:grpSpPr>
+      <p:sp>
+        <p:nvSpPr>
+          <p:cNvPr id="2" name="Slide Image Placeholder 1"/>
+          <p:cNvSpPr>
+            <a:spLocks noGrp="1" noRot="1" noChangeAspect="1"/>
+          </p:cNvSpPr>
+          <p:nvPr>
+            <p:ph type="sldImg"/>
+          </p:nvPr>
+        </p:nvSpPr>
+        <p:spPr/>
+      </p:sp>
+      <p:sp>
+        <p:nvSpPr>
+          <p:cNvPr id="3" name="Notes Placeholder 2"/>
+          <p:cNvSpPr>
+            <a:spLocks noGrp="1"/>
+          </p:cNvSpPr>
+          <p:nvPr>
+            <p:ph type="body" idx="1"/>
+          </p:nvPr>
+        </p:nvSpPr>
+        <p:spPr/>
+        <p:txBody>
+          <a:bodyPr/>
+          <a:lstStyle/>
+          <a:p>
+            <a:endParaRPr lang="en-US" dirty="0"/>
+          </a:p>
+        </p:txBody>
+      </p:sp>
+      <p:sp>
+        <p:nvSpPr>
+          <p:cNvPr id="4" name="Slide Number Placeholder 3"/>
+          <p:cNvSpPr>
+            <a:spLocks noGrp="1"/>
+          </p:cNvSpPr>
+          <p:nvPr>
+            <p:ph type="sldNum" sz="quarter" idx="10"/>
+          </p:nvPr>
+        </p:nvSpPr>
+        <p:spPr/>
+        <p:txBody>
+          <a:bodyPr/>
+          <a:lstStyle/>
+          <a:p>
+            <a:fld id="{3B678425-7935-0947-9D6B-A56BEF3384E0}" type="slidenum">
+              <a:rPr lang="en-US" smtClean="0"/>
               <a:t>9</a:t>
             </a:fld>
             <a:endParaRPr lang="en-US"/>
@@ -17699,7 +17751,7 @@
 </p:notes>
 </file>
 
-<file path=ppt/notesSlides/notesSlide7.xml><?xml version="1.0" encoding="utf-8"?>
+<file path=ppt/notesSlides/notesSlide8.xml><?xml version="1.0" encoding="utf-8"?>
 <p:notes xmlns:a="http://schemas.openxmlformats.org/drawingml/2006/main" xmlns:r="http://schemas.openxmlformats.org/officeDocument/2006/relationships" xmlns:p="http://schemas.openxmlformats.org/presentationml/2006/main">
   <p:cSld>
     <p:spTree>
@@ -17971,7 +18023,7 @@
           <a:p>
             <a:fld id="{8836BCBE-A886-9C47-AC0E-F571ABAD2DA2}" type="datetimeFigureOut">
               <a:rPr lang="en-US" smtClean="0"/>
-              <a:t>9/29/17</a:t>
+              <a:t>10/2/17</a:t>
             </a:fld>
             <a:endParaRPr lang="en-US"/>
           </a:p>
@@ -18309,7 +18361,7 @@
           <a:p>
             <a:fld id="{8836BCBE-A886-9C47-AC0E-F571ABAD2DA2}" type="datetimeFigureOut">
               <a:rPr lang="en-US" smtClean="0"/>
-              <a:t>9/29/17</a:t>
+              <a:t>10/2/17</a:t>
             </a:fld>
             <a:endParaRPr lang="en-US"/>
           </a:p>
@@ -18705,7 +18757,7 @@
           <a:p>
             <a:fld id="{8836BCBE-A886-9C47-AC0E-F571ABAD2DA2}" type="datetimeFigureOut">
               <a:rPr lang="en-US" smtClean="0"/>
-              <a:t>9/29/17</a:t>
+              <a:t>10/2/17</a:t>
             </a:fld>
             <a:endParaRPr lang="en-US"/>
           </a:p>
@@ -19036,7 +19088,7 @@
           <a:p>
             <a:fld id="{8836BCBE-A886-9C47-AC0E-F571ABAD2DA2}" type="datetimeFigureOut">
               <a:rPr lang="en-US" smtClean="0"/>
-              <a:t>9/29/17</a:t>
+              <a:t>10/2/17</a:t>
             </a:fld>
             <a:endParaRPr lang="en-US"/>
           </a:p>
@@ -19351,7 +19403,7 @@
           <a:p>
             <a:fld id="{8836BCBE-A886-9C47-AC0E-F571ABAD2DA2}" type="datetimeFigureOut">
               <a:rPr lang="en-US" smtClean="0"/>
-              <a:t>9/29/17</a:t>
+              <a:t>10/2/17</a:t>
             </a:fld>
             <a:endParaRPr lang="en-US"/>
           </a:p>
@@ -19742,7 +19794,7 @@
           <a:p>
             <a:fld id="{8836BCBE-A886-9C47-AC0E-F571ABAD2DA2}" type="datetimeFigureOut">
               <a:rPr lang="en-US" smtClean="0"/>
-              <a:t>9/29/17</a:t>
+              <a:t>10/2/17</a:t>
             </a:fld>
             <a:endParaRPr lang="en-US"/>
           </a:p>
@@ -19994,7 +20046,7 @@
           <a:p>
             <a:fld id="{8836BCBE-A886-9C47-AC0E-F571ABAD2DA2}" type="datetimeFigureOut">
               <a:rPr lang="en-US" smtClean="0"/>
-              <a:t>9/29/17</a:t>
+              <a:t>10/2/17</a:t>
             </a:fld>
             <a:endParaRPr lang="en-US"/>
           </a:p>
@@ -20251,7 +20303,7 @@
           <a:p>
             <a:fld id="{8836BCBE-A886-9C47-AC0E-F571ABAD2DA2}" type="datetimeFigureOut">
               <a:rPr lang="en-US" smtClean="0"/>
-              <a:t>9/29/17</a:t>
+              <a:t>10/2/17</a:t>
             </a:fld>
             <a:endParaRPr lang="en-US"/>
           </a:p>
@@ -20513,7 +20565,7 @@
           <a:p>
             <a:fld id="{8836BCBE-A886-9C47-AC0E-F571ABAD2DA2}" type="datetimeFigureOut">
               <a:rPr lang="en-US" smtClean="0"/>
-              <a:t>9/29/17</a:t>
+              <a:t>10/2/17</a:t>
             </a:fld>
             <a:endParaRPr lang="en-US"/>
           </a:p>
@@ -20837,7 +20889,7 @@
           <a:p>
             <a:fld id="{8836BCBE-A886-9C47-AC0E-F571ABAD2DA2}" type="datetimeFigureOut">
               <a:rPr lang="en-US" smtClean="0"/>
-              <a:t>9/29/17</a:t>
+              <a:t>10/2/17</a:t>
             </a:fld>
             <a:endParaRPr lang="en-US"/>
           </a:p>
@@ -21160,7 +21212,7 @@
           <a:p>
             <a:fld id="{8836BCBE-A886-9C47-AC0E-F571ABAD2DA2}" type="datetimeFigureOut">
               <a:rPr lang="en-US" smtClean="0"/>
-              <a:t>9/29/17</a:t>
+              <a:t>10/2/17</a:t>
             </a:fld>
             <a:endParaRPr lang="en-US"/>
           </a:p>
@@ -21617,7 +21669,7 @@
           <a:p>
             <a:fld id="{8836BCBE-A886-9C47-AC0E-F571ABAD2DA2}" type="datetimeFigureOut">
               <a:rPr lang="en-US" smtClean="0"/>
-              <a:t>9/29/17</a:t>
+              <a:t>10/2/17</a:t>
             </a:fld>
             <a:endParaRPr lang="en-US"/>
           </a:p>
@@ -21822,7 +21874,7 @@
           <a:p>
             <a:fld id="{8836BCBE-A886-9C47-AC0E-F571ABAD2DA2}" type="datetimeFigureOut">
               <a:rPr lang="en-US" smtClean="0"/>
-              <a:t>9/29/17</a:t>
+              <a:t>10/2/17</a:t>
             </a:fld>
             <a:endParaRPr lang="en-US"/>
           </a:p>
@@ -21994,7 +22046,7 @@
           <a:p>
             <a:fld id="{8836BCBE-A886-9C47-AC0E-F571ABAD2DA2}" type="datetimeFigureOut">
               <a:rPr lang="en-US" smtClean="0"/>
-              <a:t>9/29/17</a:t>
+              <a:t>10/2/17</a:t>
             </a:fld>
             <a:endParaRPr lang="en-US"/>
           </a:p>
@@ -22327,7 +22379,7 @@
           <a:p>
             <a:fld id="{8836BCBE-A886-9C47-AC0E-F571ABAD2DA2}" type="datetimeFigureOut">
               <a:rPr lang="en-US" smtClean="0"/>
-              <a:t>9/29/17</a:t>
+              <a:t>10/2/17</a:t>
             </a:fld>
             <a:endParaRPr lang="en-US"/>
           </a:p>
@@ -22672,7 +22724,7 @@
           <a:p>
             <a:fld id="{8836BCBE-A886-9C47-AC0E-F571ABAD2DA2}" type="datetimeFigureOut">
               <a:rPr lang="en-US" smtClean="0"/>
-              <a:t>9/29/17</a:t>
+              <a:t>10/2/17</a:t>
             </a:fld>
             <a:endParaRPr lang="en-US"/>
           </a:p>
@@ -24784,7 +24836,7 @@
           <a:p>
             <a:fld id="{8836BCBE-A886-9C47-AC0E-F571ABAD2DA2}" type="datetimeFigureOut">
               <a:rPr lang="en-US" smtClean="0"/>
-              <a:t>9/29/17</a:t>
+              <a:t>10/2/17</a:t>
             </a:fld>
             <a:endParaRPr lang="en-US"/>
           </a:p>
@@ -26521,11 +26573,7 @@
             </a:r>
             <a:r>
               <a:rPr lang="en-US" sz="1200" b="1" dirty="0" smtClean="0"/>
-              <a:t>functional/product </a:t>
-            </a:r>
-            <a:r>
-              <a:rPr lang="en-US" sz="1200" b="1" dirty="0" smtClean="0"/>
-              <a:t>collaboration</a:t>
+              <a:t>functional/product collaboration</a:t>
             </a:r>
             <a:endParaRPr lang="en-US" sz="1200" b="1" dirty="0"/>
           </a:p>
@@ -26644,15 +26692,7 @@
             </a:r>
             <a:r>
               <a:rPr lang="en-US" sz="1200" dirty="0" smtClean="0"/>
-              <a:t>000+ </a:t>
-            </a:r>
-            <a:r>
-              <a:rPr lang="en-US" sz="1200" dirty="0" smtClean="0"/>
-              <a:t>bare metal </a:t>
-            </a:r>
-            <a:r>
-              <a:rPr lang="en-US" sz="1200" dirty="0" smtClean="0"/>
-              <a:t>servers over 7DCs globally</a:t>
+              <a:t>000+ bare metal servers over 7DCs globally</a:t>
             </a:r>
             <a:endParaRPr lang="en-US" sz="1200" dirty="0"/>
           </a:p>
@@ -27712,7 +27752,7 @@
           <p:nvPr/>
         </p:nvPicPr>
         <p:blipFill>
-          <a:blip r:embed="rId2">
+          <a:blip r:embed="rId3">
             <a:alphaModFix amt="77000"/>
             <a:extLst>
               <a:ext uri="{28A0092B-C50C-407E-A947-70E740481C1C}">
@@ -27833,7 +27873,7 @@
           <p:nvPr/>
         </p:nvPicPr>
         <p:blipFill>
-          <a:blip r:embed="rId3"/>
+          <a:blip r:embed="rId4"/>
           <a:stretch>
             <a:fillRect/>
           </a:stretch>
@@ -28007,7 +28047,7 @@
         </p:spPr>
         <p:txBody>
           <a:bodyPr>
-            <a:normAutofit fontScale="77500" lnSpcReduction="20000"/>
+            <a:normAutofit fontScale="85000" lnSpcReduction="20000"/>
           </a:bodyPr>
           <a:lstStyle/>
           <a:p>
@@ -28068,28 +28108,34 @@
             <a:pPr lvl="1"/>
             <a:r>
               <a:rPr lang="en-US" sz="2200" dirty="0"/>
-              <a:t>Data Management	</a:t>
+              <a:t>Data </a:t>
+            </a:r>
+            <a:r>
+              <a:rPr lang="en-US" sz="2200" dirty="0" smtClean="0"/>
+              <a:t>and Storage</a:t>
+            </a:r>
+            <a:r>
+              <a:rPr lang="en-US" sz="2200" dirty="0"/>
+              <a:t>	</a:t>
             </a:r>
           </a:p>
           <a:p>
             <a:pPr lvl="1"/>
             <a:r>
-              <a:rPr lang="en-US" sz="2200" dirty="0"/>
-              <a:t>Security/Privacy</a:t>
+              <a:rPr lang="en-US" sz="2200" dirty="0" smtClean="0"/>
+              <a:t>Security and Privacy</a:t>
             </a:r>
+            <a:endParaRPr lang="en-US" sz="2200" dirty="0"/>
           </a:p>
           <a:p>
             <a:pPr lvl="1"/>
             <a:r>
-              <a:rPr lang="en-US" sz="2200" dirty="0"/>
-              <a:t>Dynamic Discovery</a:t>
+              <a:rPr lang="en-US" sz="2200" dirty="0" smtClean="0"/>
+              <a:t>API </a:t>
             </a:r>
-          </a:p>
-          <a:p>
-            <a:pPr lvl="1"/>
             <a:r>
               <a:rPr lang="en-US" sz="2200" dirty="0"/>
-              <a:t>API Management</a:t>
+              <a:t>Management</a:t>
             </a:r>
           </a:p>
           <a:p>
@@ -28108,6 +28154,48 @@
           </a:p>
           <a:p>
             <a:endParaRPr lang="en-US" dirty="0"/>
+          </a:p>
+        </p:txBody>
+      </p:sp>
+      <p:sp>
+        <p:nvSpPr>
+          <p:cNvPr id="10" name="TextBox 9"/>
+          <p:cNvSpPr txBox="1"/>
+          <p:nvPr/>
+        </p:nvSpPr>
+        <p:spPr>
+          <a:xfrm>
+            <a:off x="3597438" y="6548362"/>
+            <a:ext cx="8856133" cy="276999"/>
+          </a:xfrm>
+          <a:prstGeom prst="rect">
+            <a:avLst/>
+          </a:prstGeom>
+          <a:noFill/>
+        </p:spPr>
+        <p:txBody>
+          <a:bodyPr wrap="square" rtlCol="0">
+            <a:spAutoFit/>
+          </a:bodyPr>
+          <a:lstStyle/>
+          <a:p>
+            <a:r>
+              <a:rPr lang="en-US" sz="1200" dirty="0"/>
+              <a:t>https://github.com/</a:t>
+            </a:r>
+            <a:r>
+              <a:rPr lang="en-US" sz="1200" dirty="0" err="1"/>
+              <a:t>bbpraditkul</a:t>
+            </a:r>
+            <a:r>
+              <a:rPr lang="en-US" sz="1200" dirty="0"/>
+              <a:t>/presentations/blob/master/</a:t>
+            </a:r>
+            <a:r>
+              <a:rPr lang="en-US" sz="1200" dirty="0" err="1"/>
+              <a:t>DevOps_Monolith_Microservice_Cloud_Migration.pptx</a:t>
+            </a:r>
+            <a:endParaRPr lang="en-US" sz="1200" dirty="0"/>
           </a:p>
         </p:txBody>
       </p:sp>

</xml_diff>

<commit_message>
added item for security
</commit_message>
<xml_diff>
--- a/BPraditkul_Portfolio.pptx
+++ b/BPraditkul_Portfolio.pptx
@@ -5271,7 +5271,11 @@
         <a:p>
           <a:r>
             <a:rPr lang="en-US" dirty="0" smtClean="0"/>
-            <a:t>Build multiple communication channels (chat, workspace, email distributions, knowledge-shares)</a:t>
+            <a:t>Build communication </a:t>
+          </a:r>
+          <a:r>
+            <a:rPr lang="en-US" dirty="0" smtClean="0"/>
+            <a:t>channels (chat, workspace, email distributions, knowledge-shares)</a:t>
           </a:r>
           <a:endParaRPr lang="en-US" dirty="0"/>
         </a:p>
@@ -5600,9 +5604,29 @@
         <a:p>
           <a:r>
             <a:rPr lang="en-US" dirty="0" smtClean="0"/>
-            <a:t>Coordinate team building events.</a:t>
+            <a:t>Coordinate team building </a:t>
           </a:r>
-          <a:endParaRPr lang="en-US" dirty="0"/>
+          <a:r>
+            <a:rPr lang="en-US" dirty="0" smtClean="0">
+              <a:solidFill>
+                <a:schemeClr val="bg1"/>
+              </a:solidFill>
+            </a:rPr>
+            <a:t>events</a:t>
+          </a:r>
+          <a:r>
+            <a:rPr lang="en-US" dirty="0" smtClean="0">
+              <a:solidFill>
+                <a:schemeClr val="bg1"/>
+              </a:solidFill>
+            </a:rPr>
+            <a:t>.</a:t>
+          </a:r>
+          <a:endParaRPr lang="en-US" dirty="0">
+            <a:solidFill>
+              <a:schemeClr val="bg1"/>
+            </a:solidFill>
+          </a:endParaRPr>
         </a:p>
       </dgm:t>
     </dgm:pt>
@@ -5655,6 +5679,55 @@
       </dgm:t>
     </dgm:pt>
     <dgm:pt modelId="{70D0B245-1787-AB4F-938B-B686C5FA6455}" type="sibTrans" cxnId="{9113E9F8-E0EE-D843-BB01-A5A88961354A}">
+      <dgm:prSet/>
+      <dgm:spPr/>
+      <dgm:t>
+        <a:bodyPr/>
+        <a:lstStyle/>
+        <a:p>
+          <a:endParaRPr lang="en-US"/>
+        </a:p>
+      </dgm:t>
+    </dgm:pt>
+    <dgm:pt modelId="{9E1ED4CB-24AA-4D42-AE49-334323FDDDDF}">
+      <dgm:prSet phldrT="[Text]"/>
+      <dgm:spPr/>
+      <dgm:t>
+        <a:bodyPr/>
+        <a:lstStyle/>
+        <a:p>
+          <a:r>
+            <a:rPr lang="en-US" b="0" i="0" dirty="0" smtClean="0">
+              <a:solidFill>
+                <a:schemeClr val="bg1"/>
+              </a:solidFill>
+              <a:effectLst/>
+              <a:latin typeface="+mn-lt"/>
+              <a:ea typeface="+mn-ea"/>
+              <a:cs typeface="+mn-cs"/>
+            </a:rPr>
+            <a:t>Co-Authored Cloud Security Best practices</a:t>
+          </a:r>
+          <a:endParaRPr lang="en-US" dirty="0">
+            <a:solidFill>
+              <a:schemeClr val="bg1"/>
+            </a:solidFill>
+          </a:endParaRPr>
+        </a:p>
+      </dgm:t>
+    </dgm:pt>
+    <dgm:pt modelId="{03C033DA-E94B-974E-A7EF-EBDE94E69806}" type="parTrans" cxnId="{4E703AB5-438B-6041-B8A2-3E46CF2E1FB4}">
+      <dgm:prSet/>
+      <dgm:spPr/>
+      <dgm:t>
+        <a:bodyPr/>
+        <a:lstStyle/>
+        <a:p>
+          <a:endParaRPr lang="en-US"/>
+        </a:p>
+      </dgm:t>
+    </dgm:pt>
+    <dgm:pt modelId="{43F5EEB5-AC1C-DB40-9251-4CF442809C2C}" type="sibTrans" cxnId="{4E703AB5-438B-6041-B8A2-3E46CF2E1FB4}">
       <dgm:prSet/>
       <dgm:spPr/>
       <dgm:t>
@@ -5708,6 +5781,13 @@
           </a:stretch>
         </a:blipFill>
       </dgm:spPr>
+      <dgm:t>
+        <a:bodyPr/>
+        <a:lstStyle/>
+        <a:p>
+          <a:endParaRPr lang="en-US"/>
+        </a:p>
+      </dgm:t>
     </dgm:pt>
     <dgm:pt modelId="{EC0C6041-D98E-0848-8FAB-9D8B2317BFA5}" type="pres">
       <dgm:prSet presAssocID="{B48DB79C-BA56-9F43-BCF4-6938CE73C94C}" presName="childNode" presStyleLbl="node1" presStyleIdx="0" presStyleCnt="4">
@@ -5769,6 +5849,13 @@
           </a:stretch>
         </a:blipFill>
       </dgm:spPr>
+      <dgm:t>
+        <a:bodyPr/>
+        <a:lstStyle/>
+        <a:p>
+          <a:endParaRPr lang="en-US"/>
+        </a:p>
+      </dgm:t>
     </dgm:pt>
     <dgm:pt modelId="{FBBECED1-24C9-D84E-B392-993BB895C89A}" type="pres">
       <dgm:prSet presAssocID="{082892F2-2812-E649-9691-836B2FEFD4BD}" presName="childNode" presStyleLbl="node1" presStyleIdx="1" presStyleCnt="4">
@@ -5830,6 +5917,13 @@
           </a:stretch>
         </a:blipFill>
       </dgm:spPr>
+      <dgm:t>
+        <a:bodyPr/>
+        <a:lstStyle/>
+        <a:p>
+          <a:endParaRPr lang="en-US"/>
+        </a:p>
+      </dgm:t>
     </dgm:pt>
     <dgm:pt modelId="{13475FE2-FAEC-D54B-AD51-F00ABD3237BA}" type="pres">
       <dgm:prSet presAssocID="{F4891107-6BC6-844D-B507-086B92DC2B74}" presName="childNode" presStyleLbl="node1" presStyleIdx="2" presStyleCnt="4">
@@ -5891,6 +5985,13 @@
           </a:stretch>
         </a:blipFill>
       </dgm:spPr>
+      <dgm:t>
+        <a:bodyPr/>
+        <a:lstStyle/>
+        <a:p>
+          <a:endParaRPr lang="en-US"/>
+        </a:p>
+      </dgm:t>
     </dgm:pt>
     <dgm:pt modelId="{B4D39E13-E1E6-DF41-8EB4-24BB3BD374EC}" type="pres">
       <dgm:prSet presAssocID="{91437957-1F63-3B4C-A48F-AA23A8C46A90}" presName="childNode" presStyleLbl="node1" presStyleIdx="3" presStyleCnt="4">
@@ -5925,10 +6026,12 @@
     </dgm:pt>
   </dgm:ptLst>
   <dgm:cxnLst>
+    <dgm:cxn modelId="{E2E46EDE-7247-4747-8E3E-C24CAC0903DF}" type="presOf" srcId="{9E1ED4CB-24AA-4D42-AE49-334323FDDDDF}" destId="{13475FE2-FAEC-D54B-AD51-F00ABD3237BA}" srcOrd="0" destOrd="5" presId="urn:microsoft.com/office/officeart/2005/8/layout/hList2"/>
     <dgm:cxn modelId="{2625AC5A-2ACF-1249-A15F-C978BFDF1D93}" srcId="{B48DB79C-BA56-9F43-BCF4-6938CE73C94C}" destId="{0A42674D-AA8A-C44D-BDBE-5F79217764FD}" srcOrd="1" destOrd="0" parTransId="{24D986D5-0219-F945-933B-3D93BCCCEC38}" sibTransId="{F720087C-E552-D440-AAA3-A09B1887A599}"/>
     <dgm:cxn modelId="{FEF4C39C-3A72-FA4C-B51F-460D02BD2E47}" type="presOf" srcId="{91437957-1F63-3B4C-A48F-AA23A8C46A90}" destId="{37B0B9B4-132B-6C40-9AA0-CF759A9677B7}" srcOrd="0" destOrd="0" presId="urn:microsoft.com/office/officeart/2005/8/layout/hList2"/>
     <dgm:cxn modelId="{0B8D1E00-BDAB-E240-B8F1-0973B27837BD}" srcId="{F4891107-6BC6-844D-B507-086B92DC2B74}" destId="{A79765E9-8543-C745-8187-88BA1CF14750}" srcOrd="0" destOrd="0" parTransId="{62DE12A7-00A3-AE41-9A7A-59F73CA9CF9F}" sibTransId="{492AE00F-0B14-8945-81DB-5F25B81B0BE5}"/>
     <dgm:cxn modelId="{ADA35756-5D52-3A40-875C-75CDA32810EA}" srcId="{140EC209-3323-A14D-B70D-33DED4EDB40C}" destId="{082892F2-2812-E649-9691-836B2FEFD4BD}" srcOrd="1" destOrd="0" parTransId="{F5B212BF-AEC3-2D4C-A41D-CD1108ADEAE9}" sibTransId="{488252D0-ED3D-A448-A5D1-E0C3499CA1D3}"/>
+    <dgm:cxn modelId="{4E703AB5-438B-6041-B8A2-3E46CF2E1FB4}" srcId="{F4891107-6BC6-844D-B507-086B92DC2B74}" destId="{9E1ED4CB-24AA-4D42-AE49-334323FDDDDF}" srcOrd="5" destOrd="0" parTransId="{03C033DA-E94B-974E-A7EF-EBDE94E69806}" sibTransId="{43F5EEB5-AC1C-DB40-9251-4CF442809C2C}"/>
     <dgm:cxn modelId="{EBC87659-4932-F447-A759-0622E0C7124F}" srcId="{F4891107-6BC6-844D-B507-086B92DC2B74}" destId="{F846F2F4-5065-2C4F-90CE-D115B294C128}" srcOrd="2" destOrd="0" parTransId="{62C6297B-782F-AB4F-8583-2CEE2C02BE14}" sibTransId="{C0D809DA-3D7B-A340-BF21-EF926030B176}"/>
     <dgm:cxn modelId="{86A210E0-2577-C044-98B1-C35B857CA6EC}" srcId="{F4891107-6BC6-844D-B507-086B92DC2B74}" destId="{E80ECBCC-BC5E-0640-9DD2-579B9E34C025}" srcOrd="4" destOrd="0" parTransId="{1FE59AD9-1616-AB44-BA96-825567902546}" sibTransId="{DB0EF97D-41A5-7C42-A6D8-8FF97EC2C2C6}"/>
     <dgm:cxn modelId="{1B640EB0-9828-A046-9851-DCC4C517963F}" srcId="{082892F2-2812-E649-9691-836B2FEFD4BD}" destId="{9D39F982-24AA-164C-96FE-60DE511458D1}" srcOrd="1" destOrd="0" parTransId="{A7220F80-CC66-934C-9EC1-44CDFAAAFE50}" sibTransId="{90AB6B56-2BDB-AF49-8931-22B0F96735D6}"/>
@@ -5986,7 +6089,7 @@
   <dgm:whole/>
   <dgm:extLst>
     <a:ext uri="http://schemas.microsoft.com/office/drawing/2008/diagram">
-      <dsp:dataModelExt xmlns:dsp="http://schemas.microsoft.com/office/drawing/2008/diagram" relId="rId6" minVer="http://schemas.openxmlformats.org/drawingml/2006/diagram"/>
+      <dsp:dataModelExt xmlns:dsp="http://schemas.microsoft.com/office/drawing/2008/diagram" relId="rId7" minVer="http://schemas.openxmlformats.org/drawingml/2006/diagram"/>
     </a:ext>
   </dgm:extLst>
 </dgm:dataModel>
@@ -9709,7 +9812,11 @@
           </a:pPr>
           <a:r>
             <a:rPr lang="en-US" sz="1200" kern="1200" dirty="0" smtClean="0"/>
-            <a:t>Build multiple communication channels (chat, workspace, email distributions, knowledge-shares)</a:t>
+            <a:t>Build communication </a:t>
+          </a:r>
+          <a:r>
+            <a:rPr lang="en-US" sz="1200" kern="1200" dirty="0" smtClean="0"/>
+            <a:t>channels (chat, workspace, email distributions, knowledge-shares)</a:t>
           </a:r>
           <a:endParaRPr lang="en-US" sz="1200" kern="1200" dirty="0"/>
         </a:p>
@@ -9766,9 +9873,60 @@
           </a:pPr>
           <a:r>
             <a:rPr lang="en-US" sz="1200" kern="1200" dirty="0" smtClean="0"/>
-            <a:t>Coordinate team building events.</a:t>
+            <a:t>Coordinate team building </a:t>
           </a:r>
-          <a:endParaRPr lang="en-US" sz="1200" kern="1200" dirty="0"/>
+          <a:r>
+            <a:rPr lang="en-US" sz="1200" kern="1200" dirty="0" smtClean="0">
+              <a:solidFill>
+                <a:schemeClr val="bg1"/>
+              </a:solidFill>
+            </a:rPr>
+            <a:t>events</a:t>
+          </a:r>
+          <a:r>
+            <a:rPr lang="en-US" sz="1200" kern="1200" dirty="0" smtClean="0">
+              <a:solidFill>
+                <a:schemeClr val="bg1"/>
+              </a:solidFill>
+            </a:rPr>
+            <a:t>.</a:t>
+          </a:r>
+          <a:endParaRPr lang="en-US" sz="1200" kern="1200" dirty="0">
+            <a:solidFill>
+              <a:schemeClr val="bg1"/>
+            </a:solidFill>
+          </a:endParaRPr>
+        </a:p>
+        <a:p>
+          <a:pPr marL="114300" lvl="1" indent="-114300" algn="l" defTabSz="533400">
+            <a:lnSpc>
+              <a:spcPct val="90000"/>
+            </a:lnSpc>
+            <a:spcBef>
+              <a:spcPct val="0"/>
+            </a:spcBef>
+            <a:spcAft>
+              <a:spcPct val="15000"/>
+            </a:spcAft>
+            <a:buChar char="•"/>
+          </a:pPr>
+          <a:r>
+            <a:rPr lang="en-US" sz="1200" b="0" i="0" kern="1200" dirty="0" smtClean="0">
+              <a:solidFill>
+                <a:schemeClr val="bg1"/>
+              </a:solidFill>
+              <a:effectLst/>
+              <a:latin typeface="+mn-lt"/>
+              <a:ea typeface="+mn-ea"/>
+              <a:cs typeface="+mn-cs"/>
+            </a:rPr>
+            <a:t>Co-Authored Cloud Security Best practices</a:t>
+          </a:r>
+          <a:endParaRPr lang="en-US" sz="1200" kern="1200" dirty="0">
+            <a:solidFill>
+              <a:schemeClr val="bg1"/>
+            </a:solidFill>
+          </a:endParaRPr>
         </a:p>
       </dsp:txBody>
       <dsp:txXfrm>
@@ -17543,6 +17701,150 @@
           <a:bodyPr/>
           <a:lstStyle/>
           <a:p>
+            <a:pPr marL="0" marR="0" lvl="0" indent="0" algn="l" defTabSz="914400" rtl="0" eaLnBrk="1" fontAlgn="auto" latinLnBrk="0" hangingPunct="1">
+              <a:lnSpc>
+                <a:spcPct val="100000"/>
+              </a:lnSpc>
+              <a:spcBef>
+                <a:spcPts val="0"/>
+              </a:spcBef>
+              <a:spcAft>
+                <a:spcPts val="0"/>
+              </a:spcAft>
+              <a:buClrTx/>
+              <a:buSzTx/>
+              <a:buFontTx/>
+              <a:buNone/>
+              <a:tabLst/>
+              <a:defRPr/>
+            </a:pPr>
+            <a:r>
+              <a:rPr lang="en-US" b="0" i="0" dirty="0" smtClean="0">
+                <a:solidFill>
+                  <a:schemeClr val="bg1"/>
+                </a:solidFill>
+                <a:effectLst/>
+                <a:latin typeface="+mn-lt"/>
+                <a:ea typeface="+mn-ea"/>
+                <a:cs typeface="+mn-cs"/>
+              </a:rPr>
+              <a:t>Cloud best practices </a:t>
+            </a:r>
+            <a:r>
+              <a:rPr lang="en-US" b="0" i="0" dirty="0" err="1" smtClean="0">
+                <a:solidFill>
+                  <a:schemeClr val="bg1"/>
+                </a:solidFill>
+                <a:effectLst/>
+                <a:latin typeface="+mn-lt"/>
+                <a:ea typeface="+mn-ea"/>
+                <a:cs typeface="+mn-cs"/>
+              </a:rPr>
+              <a:t>eg</a:t>
+            </a:r>
+            <a:r>
+              <a:rPr lang="en-US" b="0" i="0" smtClean="0">
+                <a:solidFill>
+                  <a:schemeClr val="bg1"/>
+                </a:solidFill>
+                <a:effectLst/>
+                <a:latin typeface="+mn-lt"/>
+                <a:ea typeface="+mn-ea"/>
+                <a:cs typeface="+mn-cs"/>
+              </a:rPr>
+              <a:t>: Automated Cloud Vulnerability Management</a:t>
+            </a:r>
+            <a:endParaRPr lang="en-US" smtClean="0">
+              <a:solidFill>
+                <a:schemeClr val="bg1"/>
+              </a:solidFill>
+            </a:endParaRPr>
+          </a:p>
+          <a:p>
+            <a:endParaRPr lang="en-US" dirty="0"/>
+          </a:p>
+        </p:txBody>
+      </p:sp>
+      <p:sp>
+        <p:nvSpPr>
+          <p:cNvPr id="4" name="Slide Number Placeholder 3"/>
+          <p:cNvSpPr>
+            <a:spLocks noGrp="1"/>
+          </p:cNvSpPr>
+          <p:nvPr>
+            <p:ph type="sldNum" sz="quarter" idx="10"/>
+          </p:nvPr>
+        </p:nvSpPr>
+        <p:spPr/>
+        <p:txBody>
+          <a:bodyPr/>
+          <a:lstStyle/>
+          <a:p>
+            <a:fld id="{3B678425-7935-0947-9D6B-A56BEF3384E0}" type="slidenum">
+              <a:rPr lang="en-US" smtClean="0"/>
+              <a:t>6</a:t>
+            </a:fld>
+            <a:endParaRPr lang="en-US"/>
+          </a:p>
+        </p:txBody>
+      </p:sp>
+    </p:spTree>
+    <p:extLst>
+      <p:ext uri="{BB962C8B-B14F-4D97-AF65-F5344CB8AC3E}">
+        <p14:creationId xmlns:p14="http://schemas.microsoft.com/office/powerpoint/2010/main" val="1242987275"/>
+      </p:ext>
+    </p:extLst>
+  </p:cSld>
+  <p:clrMapOvr>
+    <a:masterClrMapping/>
+  </p:clrMapOvr>
+</p:notes>
+</file>
+
+<file path=ppt/notesSlides/notesSlide6.xml><?xml version="1.0" encoding="utf-8"?>
+<p:notes xmlns:a="http://schemas.openxmlformats.org/drawingml/2006/main" xmlns:r="http://schemas.openxmlformats.org/officeDocument/2006/relationships" xmlns:p="http://schemas.openxmlformats.org/presentationml/2006/main">
+  <p:cSld>
+    <p:spTree>
+      <p:nvGrpSpPr>
+        <p:cNvPr id="1" name=""/>
+        <p:cNvGrpSpPr/>
+        <p:nvPr/>
+      </p:nvGrpSpPr>
+      <p:grpSpPr>
+        <a:xfrm>
+          <a:off x="0" y="0"/>
+          <a:ext cx="0" cy="0"/>
+          <a:chOff x="0" y="0"/>
+          <a:chExt cx="0" cy="0"/>
+        </a:xfrm>
+      </p:grpSpPr>
+      <p:sp>
+        <p:nvSpPr>
+          <p:cNvPr id="2" name="Slide Image Placeholder 1"/>
+          <p:cNvSpPr>
+            <a:spLocks noGrp="1" noRot="1" noChangeAspect="1"/>
+          </p:cNvSpPr>
+          <p:nvPr>
+            <p:ph type="sldImg"/>
+          </p:nvPr>
+        </p:nvSpPr>
+        <p:spPr/>
+      </p:sp>
+      <p:sp>
+        <p:nvSpPr>
+          <p:cNvPr id="3" name="Notes Placeholder 2"/>
+          <p:cNvSpPr>
+            <a:spLocks noGrp="1"/>
+          </p:cNvSpPr>
+          <p:nvPr>
+            <p:ph type="body" idx="1"/>
+          </p:nvPr>
+        </p:nvSpPr>
+        <p:spPr/>
+        <p:txBody>
+          <a:bodyPr/>
+          <a:lstStyle/>
+          <a:p>
             <a:endParaRPr lang="en-US" dirty="0"/>
           </a:p>
         </p:txBody>
@@ -17583,7 +17885,7 @@
 </p:notes>
 </file>
 
-<file path=ppt/notesSlides/notesSlide6.xml><?xml version="1.0" encoding="utf-8"?>
+<file path=ppt/notesSlides/notesSlide7.xml><?xml version="1.0" encoding="utf-8"?>
 <p:notes xmlns:a="http://schemas.openxmlformats.org/drawingml/2006/main" xmlns:r="http://schemas.openxmlformats.org/officeDocument/2006/relationships" xmlns:p="http://schemas.openxmlformats.org/presentationml/2006/main">
   <p:cSld>
     <p:spTree>
@@ -17667,7 +17969,7 @@
 </p:notes>
 </file>
 
-<file path=ppt/notesSlides/notesSlide7.xml><?xml version="1.0" encoding="utf-8"?>
+<file path=ppt/notesSlides/notesSlide8.xml><?xml version="1.0" encoding="utf-8"?>
 <p:notes xmlns:a="http://schemas.openxmlformats.org/drawingml/2006/main" xmlns:r="http://schemas.openxmlformats.org/officeDocument/2006/relationships" xmlns:p="http://schemas.openxmlformats.org/presentationml/2006/main">
   <p:cSld>
     <p:spTree>
@@ -17751,7 +18053,7 @@
 </p:notes>
 </file>
 
-<file path=ppt/notesSlides/notesSlide8.xml><?xml version="1.0" encoding="utf-8"?>
+<file path=ppt/notesSlides/notesSlide9.xml><?xml version="1.0" encoding="utf-8"?>
 <p:notes xmlns:a="http://schemas.openxmlformats.org/drawingml/2006/main" xmlns:r="http://schemas.openxmlformats.org/officeDocument/2006/relationships" xmlns:p="http://schemas.openxmlformats.org/presentationml/2006/main">
   <p:cSld>
     <p:spTree>
@@ -27582,7 +27884,7 @@
           <p:nvPr>
             <p:extLst>
               <p:ext uri="{D42A27DB-BD31-4B8C-83A1-F6EECF244321}">
-                <p14:modId xmlns:p14="http://schemas.microsoft.com/office/powerpoint/2010/main" val="447219943"/>
+                <p14:modId xmlns:p14="http://schemas.microsoft.com/office/powerpoint/2010/main" val="1435890753"/>
               </p:ext>
             </p:extLst>
           </p:nvPr>
@@ -27593,7 +27895,7 @@
         </p:xfrm>
         <a:graphic>
           <a:graphicData uri="http://schemas.openxmlformats.org/drawingml/2006/diagram">
-            <dgm:relIds xmlns:dgm="http://schemas.openxmlformats.org/drawingml/2006/diagram" xmlns:r="http://schemas.openxmlformats.org/officeDocument/2006/relationships" r:dm="rId2" r:lo="rId3" r:qs="rId4" r:cs="rId5"/>
+            <dgm:relIds xmlns:dgm="http://schemas.openxmlformats.org/drawingml/2006/diagram" xmlns:r="http://schemas.openxmlformats.org/officeDocument/2006/relationships" r:dm="rId3" r:lo="rId4" r:qs="rId5" r:cs="rId6"/>
           </a:graphicData>
         </a:graphic>
       </p:graphicFrame>

</xml_diff>

<commit_message>
added transitions for prez
</commit_message>
<xml_diff>
--- a/BPraditkul_Portfolio.pptx
+++ b/BPraditkul_Portfolio.pptx
@@ -5271,11 +5271,7 @@
         <a:p>
           <a:r>
             <a:rPr lang="en-US" dirty="0" smtClean="0"/>
-            <a:t>Build communication </a:t>
-          </a:r>
-          <a:r>
-            <a:rPr lang="en-US" dirty="0" smtClean="0"/>
-            <a:t>channels (chat, workspace, email distributions, knowledge-shares)</a:t>
+            <a:t>Build communication channels (chat, workspace, email distributions, knowledge-shares)</a:t>
           </a:r>
           <a:endParaRPr lang="en-US" dirty="0"/>
         </a:p>
@@ -5612,15 +5608,7 @@
                 <a:schemeClr val="bg1"/>
               </a:solidFill>
             </a:rPr>
-            <a:t>events</a:t>
-          </a:r>
-          <a:r>
-            <a:rPr lang="en-US" dirty="0" smtClean="0">
-              <a:solidFill>
-                <a:schemeClr val="bg1"/>
-              </a:solidFill>
-            </a:rPr>
-            <a:t>.</a:t>
+            <a:t>events.</a:t>
           </a:r>
           <a:endParaRPr lang="en-US" dirty="0">
             <a:solidFill>
@@ -9812,11 +9800,7 @@
           </a:pPr>
           <a:r>
             <a:rPr lang="en-US" sz="1200" kern="1200" dirty="0" smtClean="0"/>
-            <a:t>Build communication </a:t>
-          </a:r>
-          <a:r>
-            <a:rPr lang="en-US" sz="1200" kern="1200" dirty="0" smtClean="0"/>
-            <a:t>channels (chat, workspace, email distributions, knowledge-shares)</a:t>
+            <a:t>Build communication channels (chat, workspace, email distributions, knowledge-shares)</a:t>
           </a:r>
           <a:endParaRPr lang="en-US" sz="1200" kern="1200" dirty="0"/>
         </a:p>
@@ -9881,15 +9865,7 @@
                 <a:schemeClr val="bg1"/>
               </a:solidFill>
             </a:rPr>
-            <a:t>events</a:t>
-          </a:r>
-          <a:r>
-            <a:rPr lang="en-US" sz="1200" kern="1200" dirty="0" smtClean="0">
-              <a:solidFill>
-                <a:schemeClr val="bg1"/>
-              </a:solidFill>
-            </a:rPr>
-            <a:t>.</a:t>
+            <a:t>events.</a:t>
           </a:r>
           <a:endParaRPr lang="en-US" sz="1200" kern="1200" dirty="0">
             <a:solidFill>
@@ -26219,6 +26195,13 @@
   <p:clrMapOvr>
     <a:masterClrMapping/>
   </p:clrMapOvr>
+  <p:timing>
+    <p:tnLst>
+      <p:par>
+        <p:cTn id="1" dur="indefinite" restart="never" nodeType="tmRoot"/>
+      </p:par>
+    </p:tnLst>
+  </p:timing>
 </p:sld>
 </file>
 
@@ -27324,7 +27307,7 @@
         </p:blipFill>
         <p:spPr>
           <a:xfrm>
-            <a:off x="7529521" y="4472674"/>
+            <a:off x="7645273" y="4504772"/>
             <a:ext cx="2832195" cy="1259510"/>
           </a:xfrm>
           <a:prstGeom prst="rect">
@@ -27555,9 +27538,1029 @@
   <p:timing>
     <p:tnLst>
       <p:par>
-        <p:cTn id="1" dur="indefinite" restart="never" nodeType="tmRoot"/>
+        <p:cTn id="1" dur="indefinite" restart="never" nodeType="tmRoot">
+          <p:childTnLst>
+            <p:seq concurrent="1" nextAc="seek">
+              <p:cTn id="2" dur="indefinite" nodeType="mainSeq">
+                <p:childTnLst>
+                  <p:par>
+                    <p:cTn id="3" fill="hold">
+                      <p:stCondLst>
+                        <p:cond delay="indefinite"/>
+                      </p:stCondLst>
+                      <p:childTnLst>
+                        <p:par>
+                          <p:cTn id="4" fill="hold">
+                            <p:stCondLst>
+                              <p:cond delay="0"/>
+                            </p:stCondLst>
+                            <p:childTnLst>
+                              <p:par>
+                                <p:cTn id="5" presetID="9" presetClass="entr" presetSubtype="0" fill="hold" grpId="0" nodeType="clickEffect">
+                                  <p:stCondLst>
+                                    <p:cond delay="0"/>
+                                  </p:stCondLst>
+                                  <p:childTnLst>
+                                    <p:set>
+                                      <p:cBhvr>
+                                        <p:cTn id="6" dur="1" fill="hold">
+                                          <p:stCondLst>
+                                            <p:cond delay="0"/>
+                                          </p:stCondLst>
+                                        </p:cTn>
+                                        <p:tgtEl>
+                                          <p:spTgt spid="68"/>
+                                        </p:tgtEl>
+                                        <p:attrNameLst>
+                                          <p:attrName>style.visibility</p:attrName>
+                                        </p:attrNameLst>
+                                      </p:cBhvr>
+                                      <p:to>
+                                        <p:strVal val="visible"/>
+                                      </p:to>
+                                    </p:set>
+                                    <p:animEffect transition="in" filter="dissolve">
+                                      <p:cBhvr>
+                                        <p:cTn id="7" dur="500"/>
+                                        <p:tgtEl>
+                                          <p:spTgt spid="68"/>
+                                        </p:tgtEl>
+                                      </p:cBhvr>
+                                    </p:animEffect>
+                                  </p:childTnLst>
+                                </p:cTn>
+                              </p:par>
+                              <p:par>
+                                <p:cTn id="8" presetID="9" presetClass="entr" presetSubtype="0" fill="hold" grpId="0" nodeType="withEffect">
+                                  <p:stCondLst>
+                                    <p:cond delay="0"/>
+                                  </p:stCondLst>
+                                  <p:childTnLst>
+                                    <p:set>
+                                      <p:cBhvr>
+                                        <p:cTn id="9" dur="1" fill="hold">
+                                          <p:stCondLst>
+                                            <p:cond delay="0"/>
+                                          </p:stCondLst>
+                                        </p:cTn>
+                                        <p:tgtEl>
+                                          <p:spTgt spid="81"/>
+                                        </p:tgtEl>
+                                        <p:attrNameLst>
+                                          <p:attrName>style.visibility</p:attrName>
+                                        </p:attrNameLst>
+                                      </p:cBhvr>
+                                      <p:to>
+                                        <p:strVal val="visible"/>
+                                      </p:to>
+                                    </p:set>
+                                    <p:animEffect transition="in" filter="dissolve">
+                                      <p:cBhvr>
+                                        <p:cTn id="10" dur="500"/>
+                                        <p:tgtEl>
+                                          <p:spTgt spid="81"/>
+                                        </p:tgtEl>
+                                      </p:cBhvr>
+                                    </p:animEffect>
+                                  </p:childTnLst>
+                                </p:cTn>
+                              </p:par>
+                              <p:par>
+                                <p:cTn id="11" presetID="9" presetClass="entr" presetSubtype="0" fill="hold" grpId="0" nodeType="withEffect">
+                                  <p:stCondLst>
+                                    <p:cond delay="0"/>
+                                  </p:stCondLst>
+                                  <p:childTnLst>
+                                    <p:set>
+                                      <p:cBhvr>
+                                        <p:cTn id="12" dur="1" fill="hold">
+                                          <p:stCondLst>
+                                            <p:cond delay="0"/>
+                                          </p:stCondLst>
+                                        </p:cTn>
+                                        <p:tgtEl>
+                                          <p:spTgt spid="67"/>
+                                        </p:tgtEl>
+                                        <p:attrNameLst>
+                                          <p:attrName>style.visibility</p:attrName>
+                                        </p:attrNameLst>
+                                      </p:cBhvr>
+                                      <p:to>
+                                        <p:strVal val="visible"/>
+                                      </p:to>
+                                    </p:set>
+                                    <p:animEffect transition="in" filter="dissolve">
+                                      <p:cBhvr>
+                                        <p:cTn id="13" dur="500"/>
+                                        <p:tgtEl>
+                                          <p:spTgt spid="67"/>
+                                        </p:tgtEl>
+                                      </p:cBhvr>
+                                    </p:animEffect>
+                                  </p:childTnLst>
+                                </p:cTn>
+                              </p:par>
+                              <p:par>
+                                <p:cTn id="14" presetID="9" presetClass="entr" presetSubtype="0" fill="hold" nodeType="withEffect">
+                                  <p:stCondLst>
+                                    <p:cond delay="0"/>
+                                  </p:stCondLst>
+                                  <p:childTnLst>
+                                    <p:set>
+                                      <p:cBhvr>
+                                        <p:cTn id="15" dur="1" fill="hold">
+                                          <p:stCondLst>
+                                            <p:cond delay="0"/>
+                                          </p:stCondLst>
+                                        </p:cTn>
+                                        <p:tgtEl>
+                                          <p:spTgt spid="87"/>
+                                        </p:tgtEl>
+                                        <p:attrNameLst>
+                                          <p:attrName>style.visibility</p:attrName>
+                                        </p:attrNameLst>
+                                      </p:cBhvr>
+                                      <p:to>
+                                        <p:strVal val="visible"/>
+                                      </p:to>
+                                    </p:set>
+                                    <p:animEffect transition="in" filter="dissolve">
+                                      <p:cBhvr>
+                                        <p:cTn id="16" dur="500"/>
+                                        <p:tgtEl>
+                                          <p:spTgt spid="87"/>
+                                        </p:tgtEl>
+                                      </p:cBhvr>
+                                    </p:animEffect>
+                                  </p:childTnLst>
+                                </p:cTn>
+                              </p:par>
+                              <p:par>
+                                <p:cTn id="17" presetID="9" presetClass="entr" presetSubtype="0" fill="hold" nodeType="withEffect">
+                                  <p:stCondLst>
+                                    <p:cond delay="0"/>
+                                  </p:stCondLst>
+                                  <p:childTnLst>
+                                    <p:set>
+                                      <p:cBhvr>
+                                        <p:cTn id="18" dur="1" fill="hold">
+                                          <p:stCondLst>
+                                            <p:cond delay="0"/>
+                                          </p:stCondLst>
+                                        </p:cTn>
+                                        <p:tgtEl>
+                                          <p:spTgt spid="23"/>
+                                        </p:tgtEl>
+                                        <p:attrNameLst>
+                                          <p:attrName>style.visibility</p:attrName>
+                                        </p:attrNameLst>
+                                      </p:cBhvr>
+                                      <p:to>
+                                        <p:strVal val="visible"/>
+                                      </p:to>
+                                    </p:set>
+                                    <p:animEffect transition="in" filter="dissolve">
+                                      <p:cBhvr>
+                                        <p:cTn id="19" dur="500"/>
+                                        <p:tgtEl>
+                                          <p:spTgt spid="23"/>
+                                        </p:tgtEl>
+                                      </p:cBhvr>
+                                    </p:animEffect>
+                                  </p:childTnLst>
+                                </p:cTn>
+                              </p:par>
+                              <p:par>
+                                <p:cTn id="20" presetID="9" presetClass="entr" presetSubtype="0" fill="hold" nodeType="withEffect">
+                                  <p:stCondLst>
+                                    <p:cond delay="0"/>
+                                  </p:stCondLst>
+                                  <p:childTnLst>
+                                    <p:set>
+                                      <p:cBhvr>
+                                        <p:cTn id="21" dur="1" fill="hold">
+                                          <p:stCondLst>
+                                            <p:cond delay="0"/>
+                                          </p:stCondLst>
+                                        </p:cTn>
+                                        <p:tgtEl>
+                                          <p:spTgt spid="21"/>
+                                        </p:tgtEl>
+                                        <p:attrNameLst>
+                                          <p:attrName>style.visibility</p:attrName>
+                                        </p:attrNameLst>
+                                      </p:cBhvr>
+                                      <p:to>
+                                        <p:strVal val="visible"/>
+                                      </p:to>
+                                    </p:set>
+                                    <p:animEffect transition="in" filter="dissolve">
+                                      <p:cBhvr>
+                                        <p:cTn id="22" dur="500"/>
+                                        <p:tgtEl>
+                                          <p:spTgt spid="21"/>
+                                        </p:tgtEl>
+                                      </p:cBhvr>
+                                    </p:animEffect>
+                                  </p:childTnLst>
+                                </p:cTn>
+                              </p:par>
+                            </p:childTnLst>
+                          </p:cTn>
+                        </p:par>
+                      </p:childTnLst>
+                    </p:cTn>
+                  </p:par>
+                  <p:par>
+                    <p:cTn id="23" fill="hold">
+                      <p:stCondLst>
+                        <p:cond delay="indefinite"/>
+                      </p:stCondLst>
+                      <p:childTnLst>
+                        <p:par>
+                          <p:cTn id="24" fill="hold">
+                            <p:stCondLst>
+                              <p:cond delay="0"/>
+                            </p:stCondLst>
+                            <p:childTnLst>
+                              <p:par>
+                                <p:cTn id="25" presetID="9" presetClass="entr" presetSubtype="0" fill="hold" nodeType="clickEffect">
+                                  <p:stCondLst>
+                                    <p:cond delay="0"/>
+                                  </p:stCondLst>
+                                  <p:childTnLst>
+                                    <p:set>
+                                      <p:cBhvr>
+                                        <p:cTn id="26" dur="1" fill="hold">
+                                          <p:stCondLst>
+                                            <p:cond delay="0"/>
+                                          </p:stCondLst>
+                                        </p:cTn>
+                                        <p:tgtEl>
+                                          <p:spTgt spid="29"/>
+                                        </p:tgtEl>
+                                        <p:attrNameLst>
+                                          <p:attrName>style.visibility</p:attrName>
+                                        </p:attrNameLst>
+                                      </p:cBhvr>
+                                      <p:to>
+                                        <p:strVal val="visible"/>
+                                      </p:to>
+                                    </p:set>
+                                    <p:animEffect transition="in" filter="dissolve">
+                                      <p:cBhvr>
+                                        <p:cTn id="27" dur="500"/>
+                                        <p:tgtEl>
+                                          <p:spTgt spid="29"/>
+                                        </p:tgtEl>
+                                      </p:cBhvr>
+                                    </p:animEffect>
+                                  </p:childTnLst>
+                                </p:cTn>
+                              </p:par>
+                              <p:par>
+                                <p:cTn id="28" presetID="9" presetClass="entr" presetSubtype="0" fill="hold" grpId="0" nodeType="withEffect">
+                                  <p:stCondLst>
+                                    <p:cond delay="0"/>
+                                  </p:stCondLst>
+                                  <p:childTnLst>
+                                    <p:set>
+                                      <p:cBhvr>
+                                        <p:cTn id="29" dur="1" fill="hold">
+                                          <p:stCondLst>
+                                            <p:cond delay="0"/>
+                                          </p:stCondLst>
+                                        </p:cTn>
+                                        <p:tgtEl>
+                                          <p:spTgt spid="93"/>
+                                        </p:tgtEl>
+                                        <p:attrNameLst>
+                                          <p:attrName>style.visibility</p:attrName>
+                                        </p:attrNameLst>
+                                      </p:cBhvr>
+                                      <p:to>
+                                        <p:strVal val="visible"/>
+                                      </p:to>
+                                    </p:set>
+                                    <p:animEffect transition="in" filter="dissolve">
+                                      <p:cBhvr>
+                                        <p:cTn id="30" dur="500"/>
+                                        <p:tgtEl>
+                                          <p:spTgt spid="93"/>
+                                        </p:tgtEl>
+                                      </p:cBhvr>
+                                    </p:animEffect>
+                                  </p:childTnLst>
+                                </p:cTn>
+                              </p:par>
+                              <p:par>
+                                <p:cTn id="31" presetID="9" presetClass="entr" presetSubtype="0" fill="hold" grpId="0" nodeType="withEffect">
+                                  <p:stCondLst>
+                                    <p:cond delay="0"/>
+                                  </p:stCondLst>
+                                  <p:childTnLst>
+                                    <p:set>
+                                      <p:cBhvr>
+                                        <p:cTn id="32" dur="1" fill="hold">
+                                          <p:stCondLst>
+                                            <p:cond delay="0"/>
+                                          </p:stCondLst>
+                                        </p:cTn>
+                                        <p:tgtEl>
+                                          <p:spTgt spid="66"/>
+                                        </p:tgtEl>
+                                        <p:attrNameLst>
+                                          <p:attrName>style.visibility</p:attrName>
+                                        </p:attrNameLst>
+                                      </p:cBhvr>
+                                      <p:to>
+                                        <p:strVal val="visible"/>
+                                      </p:to>
+                                    </p:set>
+                                    <p:animEffect transition="in" filter="dissolve">
+                                      <p:cBhvr>
+                                        <p:cTn id="33" dur="500"/>
+                                        <p:tgtEl>
+                                          <p:spTgt spid="66"/>
+                                        </p:tgtEl>
+                                      </p:cBhvr>
+                                    </p:animEffect>
+                                  </p:childTnLst>
+                                </p:cTn>
+                              </p:par>
+                              <p:par>
+                                <p:cTn id="34" presetID="9" presetClass="entr" presetSubtype="0" fill="hold" nodeType="withEffect">
+                                  <p:stCondLst>
+                                    <p:cond delay="0"/>
+                                  </p:stCondLst>
+                                  <p:childTnLst>
+                                    <p:set>
+                                      <p:cBhvr>
+                                        <p:cTn id="35" dur="1" fill="hold">
+                                          <p:stCondLst>
+                                            <p:cond delay="0"/>
+                                          </p:stCondLst>
+                                        </p:cTn>
+                                        <p:tgtEl>
+                                          <p:spTgt spid="114"/>
+                                        </p:tgtEl>
+                                        <p:attrNameLst>
+                                          <p:attrName>style.visibility</p:attrName>
+                                        </p:attrNameLst>
+                                      </p:cBhvr>
+                                      <p:to>
+                                        <p:strVal val="visible"/>
+                                      </p:to>
+                                    </p:set>
+                                    <p:animEffect transition="in" filter="dissolve">
+                                      <p:cBhvr>
+                                        <p:cTn id="36" dur="500"/>
+                                        <p:tgtEl>
+                                          <p:spTgt spid="114"/>
+                                        </p:tgtEl>
+                                      </p:cBhvr>
+                                    </p:animEffect>
+                                  </p:childTnLst>
+                                </p:cTn>
+                              </p:par>
+                              <p:par>
+                                <p:cTn id="37" presetID="9" presetClass="entr" presetSubtype="0" fill="hold" nodeType="withEffect">
+                                  <p:stCondLst>
+                                    <p:cond delay="0"/>
+                                  </p:stCondLst>
+                                  <p:childTnLst>
+                                    <p:set>
+                                      <p:cBhvr>
+                                        <p:cTn id="38" dur="1" fill="hold">
+                                          <p:stCondLst>
+                                            <p:cond delay="0"/>
+                                          </p:stCondLst>
+                                        </p:cTn>
+                                        <p:tgtEl>
+                                          <p:spTgt spid="25"/>
+                                        </p:tgtEl>
+                                        <p:attrNameLst>
+                                          <p:attrName>style.visibility</p:attrName>
+                                        </p:attrNameLst>
+                                      </p:cBhvr>
+                                      <p:to>
+                                        <p:strVal val="visible"/>
+                                      </p:to>
+                                    </p:set>
+                                    <p:animEffect transition="in" filter="dissolve">
+                                      <p:cBhvr>
+                                        <p:cTn id="39" dur="500"/>
+                                        <p:tgtEl>
+                                          <p:spTgt spid="25"/>
+                                        </p:tgtEl>
+                                      </p:cBhvr>
+                                    </p:animEffect>
+                                  </p:childTnLst>
+                                </p:cTn>
+                              </p:par>
+                              <p:par>
+                                <p:cTn id="40" presetID="9" presetClass="entr" presetSubtype="0" fill="hold" grpId="0" nodeType="withEffect">
+                                  <p:stCondLst>
+                                    <p:cond delay="0"/>
+                                  </p:stCondLst>
+                                  <p:childTnLst>
+                                    <p:set>
+                                      <p:cBhvr>
+                                        <p:cTn id="41" dur="1" fill="hold">
+                                          <p:stCondLst>
+                                            <p:cond delay="0"/>
+                                          </p:stCondLst>
+                                        </p:cTn>
+                                        <p:tgtEl>
+                                          <p:spTgt spid="69"/>
+                                        </p:tgtEl>
+                                        <p:attrNameLst>
+                                          <p:attrName>style.visibility</p:attrName>
+                                        </p:attrNameLst>
+                                      </p:cBhvr>
+                                      <p:to>
+                                        <p:strVal val="visible"/>
+                                      </p:to>
+                                    </p:set>
+                                    <p:animEffect transition="in" filter="dissolve">
+                                      <p:cBhvr>
+                                        <p:cTn id="42" dur="500"/>
+                                        <p:tgtEl>
+                                          <p:spTgt spid="69"/>
+                                        </p:tgtEl>
+                                      </p:cBhvr>
+                                    </p:animEffect>
+                                  </p:childTnLst>
+                                </p:cTn>
+                              </p:par>
+                            </p:childTnLst>
+                          </p:cTn>
+                        </p:par>
+                      </p:childTnLst>
+                    </p:cTn>
+                  </p:par>
+                  <p:par>
+                    <p:cTn id="43" fill="hold">
+                      <p:stCondLst>
+                        <p:cond delay="indefinite"/>
+                      </p:stCondLst>
+                      <p:childTnLst>
+                        <p:par>
+                          <p:cTn id="44" fill="hold">
+                            <p:stCondLst>
+                              <p:cond delay="0"/>
+                            </p:stCondLst>
+                            <p:childTnLst>
+                              <p:par>
+                                <p:cTn id="45" presetID="9" presetClass="entr" presetSubtype="0" fill="hold" nodeType="clickEffect">
+                                  <p:stCondLst>
+                                    <p:cond delay="0"/>
+                                  </p:stCondLst>
+                                  <p:childTnLst>
+                                    <p:set>
+                                      <p:cBhvr>
+                                        <p:cTn id="46" dur="1" fill="hold">
+                                          <p:stCondLst>
+                                            <p:cond delay="0"/>
+                                          </p:stCondLst>
+                                        </p:cTn>
+                                        <p:tgtEl>
+                                          <p:spTgt spid="113"/>
+                                        </p:tgtEl>
+                                        <p:attrNameLst>
+                                          <p:attrName>style.visibility</p:attrName>
+                                        </p:attrNameLst>
+                                      </p:cBhvr>
+                                      <p:to>
+                                        <p:strVal val="visible"/>
+                                      </p:to>
+                                    </p:set>
+                                    <p:animEffect transition="in" filter="dissolve">
+                                      <p:cBhvr>
+                                        <p:cTn id="47" dur="500"/>
+                                        <p:tgtEl>
+                                          <p:spTgt spid="113"/>
+                                        </p:tgtEl>
+                                      </p:cBhvr>
+                                    </p:animEffect>
+                                  </p:childTnLst>
+                                </p:cTn>
+                              </p:par>
+                              <p:par>
+                                <p:cTn id="48" presetID="9" presetClass="entr" presetSubtype="0" fill="hold" nodeType="withEffect">
+                                  <p:stCondLst>
+                                    <p:cond delay="0"/>
+                                  </p:stCondLst>
+                                  <p:childTnLst>
+                                    <p:set>
+                                      <p:cBhvr>
+                                        <p:cTn id="49" dur="1" fill="hold">
+                                          <p:stCondLst>
+                                            <p:cond delay="0"/>
+                                          </p:stCondLst>
+                                        </p:cTn>
+                                        <p:tgtEl>
+                                          <p:spTgt spid="15"/>
+                                        </p:tgtEl>
+                                        <p:attrNameLst>
+                                          <p:attrName>style.visibility</p:attrName>
+                                        </p:attrNameLst>
+                                      </p:cBhvr>
+                                      <p:to>
+                                        <p:strVal val="visible"/>
+                                      </p:to>
+                                    </p:set>
+                                    <p:animEffect transition="in" filter="dissolve">
+                                      <p:cBhvr>
+                                        <p:cTn id="50" dur="500"/>
+                                        <p:tgtEl>
+                                          <p:spTgt spid="15"/>
+                                        </p:tgtEl>
+                                      </p:cBhvr>
+                                    </p:animEffect>
+                                  </p:childTnLst>
+                                </p:cTn>
+                              </p:par>
+                              <p:par>
+                                <p:cTn id="51" presetID="9" presetClass="entr" presetSubtype="0" fill="hold" grpId="0" nodeType="withEffect">
+                                  <p:stCondLst>
+                                    <p:cond delay="0"/>
+                                  </p:stCondLst>
+                                  <p:childTnLst>
+                                    <p:set>
+                                      <p:cBhvr>
+                                        <p:cTn id="52" dur="1" fill="hold">
+                                          <p:stCondLst>
+                                            <p:cond delay="0"/>
+                                          </p:stCondLst>
+                                        </p:cTn>
+                                        <p:tgtEl>
+                                          <p:spTgt spid="74"/>
+                                        </p:tgtEl>
+                                        <p:attrNameLst>
+                                          <p:attrName>style.visibility</p:attrName>
+                                        </p:attrNameLst>
+                                      </p:cBhvr>
+                                      <p:to>
+                                        <p:strVal val="visible"/>
+                                      </p:to>
+                                    </p:set>
+                                    <p:animEffect transition="in" filter="dissolve">
+                                      <p:cBhvr>
+                                        <p:cTn id="53" dur="500"/>
+                                        <p:tgtEl>
+                                          <p:spTgt spid="74"/>
+                                        </p:tgtEl>
+                                      </p:cBhvr>
+                                    </p:animEffect>
+                                  </p:childTnLst>
+                                </p:cTn>
+                              </p:par>
+                              <p:par>
+                                <p:cTn id="54" presetID="9" presetClass="entr" presetSubtype="0" fill="hold" nodeType="withEffect">
+                                  <p:stCondLst>
+                                    <p:cond delay="0"/>
+                                  </p:stCondLst>
+                                  <p:childTnLst>
+                                    <p:set>
+                                      <p:cBhvr>
+                                        <p:cTn id="55" dur="1" fill="hold">
+                                          <p:stCondLst>
+                                            <p:cond delay="0"/>
+                                          </p:stCondLst>
+                                        </p:cTn>
+                                        <p:tgtEl>
+                                          <p:spTgt spid="27"/>
+                                        </p:tgtEl>
+                                        <p:attrNameLst>
+                                          <p:attrName>style.visibility</p:attrName>
+                                        </p:attrNameLst>
+                                      </p:cBhvr>
+                                      <p:to>
+                                        <p:strVal val="visible"/>
+                                      </p:to>
+                                    </p:set>
+                                    <p:animEffect transition="in" filter="dissolve">
+                                      <p:cBhvr>
+                                        <p:cTn id="56" dur="500"/>
+                                        <p:tgtEl>
+                                          <p:spTgt spid="27"/>
+                                        </p:tgtEl>
+                                      </p:cBhvr>
+                                    </p:animEffect>
+                                  </p:childTnLst>
+                                </p:cTn>
+                              </p:par>
+                              <p:par>
+                                <p:cTn id="57" presetID="9" presetClass="entr" presetSubtype="0" fill="hold" grpId="0" nodeType="withEffect">
+                                  <p:stCondLst>
+                                    <p:cond delay="0"/>
+                                  </p:stCondLst>
+                                  <p:childTnLst>
+                                    <p:set>
+                                      <p:cBhvr>
+                                        <p:cTn id="58" dur="1" fill="hold">
+                                          <p:stCondLst>
+                                            <p:cond delay="0"/>
+                                          </p:stCondLst>
+                                        </p:cTn>
+                                        <p:tgtEl>
+                                          <p:spTgt spid="70"/>
+                                        </p:tgtEl>
+                                        <p:attrNameLst>
+                                          <p:attrName>style.visibility</p:attrName>
+                                        </p:attrNameLst>
+                                      </p:cBhvr>
+                                      <p:to>
+                                        <p:strVal val="visible"/>
+                                      </p:to>
+                                    </p:set>
+                                    <p:animEffect transition="in" filter="dissolve">
+                                      <p:cBhvr>
+                                        <p:cTn id="59" dur="500"/>
+                                        <p:tgtEl>
+                                          <p:spTgt spid="70"/>
+                                        </p:tgtEl>
+                                      </p:cBhvr>
+                                    </p:animEffect>
+                                  </p:childTnLst>
+                                </p:cTn>
+                              </p:par>
+                              <p:par>
+                                <p:cTn id="60" presetID="9" presetClass="entr" presetSubtype="0" fill="hold" grpId="0" nodeType="withEffect">
+                                  <p:stCondLst>
+                                    <p:cond delay="0"/>
+                                  </p:stCondLst>
+                                  <p:childTnLst>
+                                    <p:set>
+                                      <p:cBhvr>
+                                        <p:cTn id="61" dur="1" fill="hold">
+                                          <p:stCondLst>
+                                            <p:cond delay="0"/>
+                                          </p:stCondLst>
+                                        </p:cTn>
+                                        <p:tgtEl>
+                                          <p:spTgt spid="77"/>
+                                        </p:tgtEl>
+                                        <p:attrNameLst>
+                                          <p:attrName>style.visibility</p:attrName>
+                                        </p:attrNameLst>
+                                      </p:cBhvr>
+                                      <p:to>
+                                        <p:strVal val="visible"/>
+                                      </p:to>
+                                    </p:set>
+                                    <p:animEffect transition="in" filter="dissolve">
+                                      <p:cBhvr>
+                                        <p:cTn id="62" dur="500"/>
+                                        <p:tgtEl>
+                                          <p:spTgt spid="77"/>
+                                        </p:tgtEl>
+                                      </p:cBhvr>
+                                    </p:animEffect>
+                                  </p:childTnLst>
+                                </p:cTn>
+                              </p:par>
+                            </p:childTnLst>
+                          </p:cTn>
+                        </p:par>
+                      </p:childTnLst>
+                    </p:cTn>
+                  </p:par>
+                  <p:par>
+                    <p:cTn id="63" fill="hold">
+                      <p:stCondLst>
+                        <p:cond delay="indefinite"/>
+                      </p:stCondLst>
+                      <p:childTnLst>
+                        <p:par>
+                          <p:cTn id="64" fill="hold">
+                            <p:stCondLst>
+                              <p:cond delay="0"/>
+                            </p:stCondLst>
+                            <p:childTnLst>
+                              <p:par>
+                                <p:cTn id="65" presetID="9" presetClass="entr" presetSubtype="0" fill="hold" nodeType="clickEffect">
+                                  <p:stCondLst>
+                                    <p:cond delay="0"/>
+                                  </p:stCondLst>
+                                  <p:childTnLst>
+                                    <p:set>
+                                      <p:cBhvr>
+                                        <p:cTn id="66" dur="1" fill="hold">
+                                          <p:stCondLst>
+                                            <p:cond delay="0"/>
+                                          </p:stCondLst>
+                                        </p:cTn>
+                                        <p:tgtEl>
+                                          <p:spTgt spid="103"/>
+                                        </p:tgtEl>
+                                        <p:attrNameLst>
+                                          <p:attrName>style.visibility</p:attrName>
+                                        </p:attrNameLst>
+                                      </p:cBhvr>
+                                      <p:to>
+                                        <p:strVal val="visible"/>
+                                      </p:to>
+                                    </p:set>
+                                    <p:animEffect transition="in" filter="dissolve">
+                                      <p:cBhvr>
+                                        <p:cTn id="67" dur="500"/>
+                                        <p:tgtEl>
+                                          <p:spTgt spid="103"/>
+                                        </p:tgtEl>
+                                      </p:cBhvr>
+                                    </p:animEffect>
+                                  </p:childTnLst>
+                                </p:cTn>
+                              </p:par>
+                              <p:par>
+                                <p:cTn id="68" presetID="9" presetClass="entr" presetSubtype="0" fill="hold" grpId="0" nodeType="withEffect">
+                                  <p:stCondLst>
+                                    <p:cond delay="0"/>
+                                  </p:stCondLst>
+                                  <p:childTnLst>
+                                    <p:set>
+                                      <p:cBhvr>
+                                        <p:cTn id="69" dur="1" fill="hold">
+                                          <p:stCondLst>
+                                            <p:cond delay="0"/>
+                                          </p:stCondLst>
+                                        </p:cTn>
+                                        <p:tgtEl>
+                                          <p:spTgt spid="79"/>
+                                        </p:tgtEl>
+                                        <p:attrNameLst>
+                                          <p:attrName>style.visibility</p:attrName>
+                                        </p:attrNameLst>
+                                      </p:cBhvr>
+                                      <p:to>
+                                        <p:strVal val="visible"/>
+                                      </p:to>
+                                    </p:set>
+                                    <p:animEffect transition="in" filter="dissolve">
+                                      <p:cBhvr>
+                                        <p:cTn id="70" dur="500"/>
+                                        <p:tgtEl>
+                                          <p:spTgt spid="79"/>
+                                        </p:tgtEl>
+                                      </p:cBhvr>
+                                    </p:animEffect>
+                                  </p:childTnLst>
+                                </p:cTn>
+                              </p:par>
+                              <p:par>
+                                <p:cTn id="71" presetID="9" presetClass="entr" presetSubtype="0" fill="hold" nodeType="withEffect">
+                                  <p:stCondLst>
+                                    <p:cond delay="0"/>
+                                  </p:stCondLst>
+                                  <p:childTnLst>
+                                    <p:set>
+                                      <p:cBhvr>
+                                        <p:cTn id="72" dur="1" fill="hold">
+                                          <p:stCondLst>
+                                            <p:cond delay="0"/>
+                                          </p:stCondLst>
+                                        </p:cTn>
+                                        <p:tgtEl>
+                                          <p:spTgt spid="95"/>
+                                        </p:tgtEl>
+                                        <p:attrNameLst>
+                                          <p:attrName>style.visibility</p:attrName>
+                                        </p:attrNameLst>
+                                      </p:cBhvr>
+                                      <p:to>
+                                        <p:strVal val="visible"/>
+                                      </p:to>
+                                    </p:set>
+                                    <p:animEffect transition="in" filter="dissolve">
+                                      <p:cBhvr>
+                                        <p:cTn id="73" dur="500"/>
+                                        <p:tgtEl>
+                                          <p:spTgt spid="95"/>
+                                        </p:tgtEl>
+                                      </p:cBhvr>
+                                    </p:animEffect>
+                                  </p:childTnLst>
+                                </p:cTn>
+                              </p:par>
+                              <p:par>
+                                <p:cTn id="74" presetID="9" presetClass="entr" presetSubtype="0" fill="hold" grpId="0" nodeType="withEffect">
+                                  <p:stCondLst>
+                                    <p:cond delay="0"/>
+                                  </p:stCondLst>
+                                  <p:childTnLst>
+                                    <p:set>
+                                      <p:cBhvr>
+                                        <p:cTn id="75" dur="1" fill="hold">
+                                          <p:stCondLst>
+                                            <p:cond delay="0"/>
+                                          </p:stCondLst>
+                                        </p:cTn>
+                                        <p:tgtEl>
+                                          <p:spTgt spid="80"/>
+                                        </p:tgtEl>
+                                        <p:attrNameLst>
+                                          <p:attrName>style.visibility</p:attrName>
+                                        </p:attrNameLst>
+                                      </p:cBhvr>
+                                      <p:to>
+                                        <p:strVal val="visible"/>
+                                      </p:to>
+                                    </p:set>
+                                    <p:animEffect transition="in" filter="dissolve">
+                                      <p:cBhvr>
+                                        <p:cTn id="76" dur="500"/>
+                                        <p:tgtEl>
+                                          <p:spTgt spid="80"/>
+                                        </p:tgtEl>
+                                      </p:cBhvr>
+                                    </p:animEffect>
+                                  </p:childTnLst>
+                                </p:cTn>
+                              </p:par>
+                              <p:par>
+                                <p:cTn id="77" presetID="9" presetClass="entr" presetSubtype="0" fill="hold" nodeType="withEffect">
+                                  <p:stCondLst>
+                                    <p:cond delay="0"/>
+                                  </p:stCondLst>
+                                  <p:childTnLst>
+                                    <p:set>
+                                      <p:cBhvr>
+                                        <p:cTn id="78" dur="1" fill="hold">
+                                          <p:stCondLst>
+                                            <p:cond delay="0"/>
+                                          </p:stCondLst>
+                                        </p:cTn>
+                                        <p:tgtEl>
+                                          <p:spTgt spid="94"/>
+                                        </p:tgtEl>
+                                        <p:attrNameLst>
+                                          <p:attrName>style.visibility</p:attrName>
+                                        </p:attrNameLst>
+                                      </p:cBhvr>
+                                      <p:to>
+                                        <p:strVal val="visible"/>
+                                      </p:to>
+                                    </p:set>
+                                    <p:animEffect transition="in" filter="dissolve">
+                                      <p:cBhvr>
+                                        <p:cTn id="79" dur="500"/>
+                                        <p:tgtEl>
+                                          <p:spTgt spid="94"/>
+                                        </p:tgtEl>
+                                      </p:cBhvr>
+                                    </p:animEffect>
+                                  </p:childTnLst>
+                                </p:cTn>
+                              </p:par>
+                              <p:par>
+                                <p:cTn id="80" presetID="9" presetClass="entr" presetSubtype="0" fill="hold" grpId="0" nodeType="withEffect">
+                                  <p:stCondLst>
+                                    <p:cond delay="0"/>
+                                  </p:stCondLst>
+                                  <p:childTnLst>
+                                    <p:set>
+                                      <p:cBhvr>
+                                        <p:cTn id="81" dur="1" fill="hold">
+                                          <p:stCondLst>
+                                            <p:cond delay="0"/>
+                                          </p:stCondLst>
+                                        </p:cTn>
+                                        <p:tgtEl>
+                                          <p:spTgt spid="78"/>
+                                        </p:tgtEl>
+                                        <p:attrNameLst>
+                                          <p:attrName>style.visibility</p:attrName>
+                                        </p:attrNameLst>
+                                      </p:cBhvr>
+                                      <p:to>
+                                        <p:strVal val="visible"/>
+                                      </p:to>
+                                    </p:set>
+                                    <p:animEffect transition="in" filter="dissolve">
+                                      <p:cBhvr>
+                                        <p:cTn id="82" dur="500"/>
+                                        <p:tgtEl>
+                                          <p:spTgt spid="78"/>
+                                        </p:tgtEl>
+                                      </p:cBhvr>
+                                    </p:animEffect>
+                                  </p:childTnLst>
+                                </p:cTn>
+                              </p:par>
+                              <p:par>
+                                <p:cTn id="83" presetID="9" presetClass="entr" presetSubtype="0" fill="hold" nodeType="withEffect">
+                                  <p:stCondLst>
+                                    <p:cond delay="0"/>
+                                  </p:stCondLst>
+                                  <p:childTnLst>
+                                    <p:set>
+                                      <p:cBhvr>
+                                        <p:cTn id="84" dur="1" fill="hold">
+                                          <p:stCondLst>
+                                            <p:cond delay="0"/>
+                                          </p:stCondLst>
+                                        </p:cTn>
+                                        <p:tgtEl>
+                                          <p:spTgt spid="18"/>
+                                        </p:tgtEl>
+                                        <p:attrNameLst>
+                                          <p:attrName>style.visibility</p:attrName>
+                                        </p:attrNameLst>
+                                      </p:cBhvr>
+                                      <p:to>
+                                        <p:strVal val="visible"/>
+                                      </p:to>
+                                    </p:set>
+                                    <p:animEffect transition="in" filter="dissolve">
+                                      <p:cBhvr>
+                                        <p:cTn id="85" dur="500"/>
+                                        <p:tgtEl>
+                                          <p:spTgt spid="18"/>
+                                        </p:tgtEl>
+                                      </p:cBhvr>
+                                    </p:animEffect>
+                                  </p:childTnLst>
+                                </p:cTn>
+                              </p:par>
+                              <p:par>
+                                <p:cTn id="86" presetID="9" presetClass="entr" presetSubtype="0" fill="hold" grpId="0" nodeType="withEffect">
+                                  <p:stCondLst>
+                                    <p:cond delay="0"/>
+                                  </p:stCondLst>
+                                  <p:childTnLst>
+                                    <p:set>
+                                      <p:cBhvr>
+                                        <p:cTn id="87" dur="1" fill="hold">
+                                          <p:stCondLst>
+                                            <p:cond delay="0"/>
+                                          </p:stCondLst>
+                                        </p:cTn>
+                                        <p:tgtEl>
+                                          <p:spTgt spid="71"/>
+                                        </p:tgtEl>
+                                        <p:attrNameLst>
+                                          <p:attrName>style.visibility</p:attrName>
+                                        </p:attrNameLst>
+                                      </p:cBhvr>
+                                      <p:to>
+                                        <p:strVal val="visible"/>
+                                      </p:to>
+                                    </p:set>
+                                    <p:animEffect transition="in" filter="dissolve">
+                                      <p:cBhvr>
+                                        <p:cTn id="88" dur="500"/>
+                                        <p:tgtEl>
+                                          <p:spTgt spid="71"/>
+                                        </p:tgtEl>
+                                      </p:cBhvr>
+                                    </p:animEffect>
+                                  </p:childTnLst>
+                                </p:cTn>
+                              </p:par>
+                            </p:childTnLst>
+                          </p:cTn>
+                        </p:par>
+                      </p:childTnLst>
+                    </p:cTn>
+                  </p:par>
+                </p:childTnLst>
+              </p:cTn>
+              <p:prevCondLst>
+                <p:cond evt="onPrev" delay="0">
+                  <p:tgtEl>
+                    <p:sldTgt/>
+                  </p:tgtEl>
+                </p:cond>
+              </p:prevCondLst>
+              <p:nextCondLst>
+                <p:cond evt="onNext" delay="0">
+                  <p:tgtEl>
+                    <p:sldTgt/>
+                  </p:tgtEl>
+                </p:cond>
+              </p:nextCondLst>
+            </p:seq>
+          </p:childTnLst>
+        </p:cTn>
       </p:par>
     </p:tnLst>
+    <p:bldLst>
+      <p:bldP spid="66" grpId="0"/>
+      <p:bldP spid="67" grpId="0"/>
+      <p:bldP spid="68" grpId="0"/>
+      <p:bldP spid="69" grpId="0"/>
+      <p:bldP spid="70" grpId="0"/>
+      <p:bldP spid="71" grpId="0"/>
+      <p:bldP spid="74" grpId="0"/>
+      <p:bldP spid="77" grpId="0"/>
+      <p:bldP spid="78" grpId="0"/>
+      <p:bldP spid="79" grpId="0"/>
+      <p:bldP spid="80" grpId="0"/>
+      <p:bldP spid="81" grpId="0"/>
+      <p:bldP spid="93" grpId="0"/>
+    </p:bldLst>
   </p:timing>
 </p:sld>
 </file>

</xml_diff>